<commit_message>
brief content for upcoming lesson
</commit_message>
<xml_diff>
--- a/20241106-lesson8.pptx
+++ b/20241106-lesson8.pptx
@@ -8,7 +8,8 @@
     <p:sldId id="476" r:id="rId2"/>
     <p:sldId id="519" r:id="rId3"/>
     <p:sldId id="515" r:id="rId4"/>
-    <p:sldId id="517" r:id="rId5"/>
+    <p:sldId id="520" r:id="rId5"/>
+    <p:sldId id="517" r:id="rId6"/>
   </p:sldIdLst>
   <p:sldSz cx="12192000" cy="6858000"/>
   <p:notesSz cx="6858000" cy="9144000"/>
@@ -6830,10 +6831,10 @@
       </p:sp>
       <p:pic>
         <p:nvPicPr>
-          <p:cNvPr id="5122" name="Picture 2">
-            <a:extLst>
-              <a:ext uri="{FF2B5EF4-FFF2-40B4-BE49-F238E27FC236}">
-                <a16:creationId xmlns:a16="http://schemas.microsoft.com/office/drawing/2014/main" id="{329A3399-69FA-B2EC-1D54-E09703AFB096}"/>
+          <p:cNvPr id="4" name="Picture 2">
+            <a:extLst>
+              <a:ext uri="{FF2B5EF4-FFF2-40B4-BE49-F238E27FC236}">
+                <a16:creationId xmlns:a16="http://schemas.microsoft.com/office/drawing/2014/main" id="{A18D9198-B184-DEFB-CF7B-BEB0FBA89D31}"/>
               </a:ext>
             </a:extLst>
           </p:cNvPr>
@@ -6843,7 +6844,7 @@
           <p:nvPr/>
         </p:nvPicPr>
         <p:blipFill>
-          <a:blip>
+          <a:blip r:embed="rId2">
             <a:extLst>
               <a:ext uri="{28A0092B-C50C-407E-A947-70E740481C1C}">
                 <a14:useLocalDpi xmlns:a14="http://schemas.microsoft.com/office/drawing/2010/main" val="0"/>
@@ -6857,7 +6858,7 @@
         </p:blipFill>
         <p:spPr bwMode="auto">
           <a:xfrm>
-            <a:off x="10256275" y="6177345"/>
+            <a:off x="10380834" y="6122894"/>
             <a:ext cx="1485900" cy="520700"/>
           </a:xfrm>
           <a:prstGeom prst="rect">
@@ -7693,6 +7694,89 @@
 </file>
 
 <file path=ppt/slides/slide4.xml><?xml version="1.0" encoding="utf-8"?>
+<p:sld xmlns:a="http://schemas.openxmlformats.org/drawingml/2006/main" xmlns:r="http://schemas.openxmlformats.org/officeDocument/2006/relationships" xmlns:p="http://schemas.openxmlformats.org/presentationml/2006/main">
+  <p:cSld>
+    <p:spTree>
+      <p:nvGrpSpPr>
+        <p:cNvPr id="1" name=""/>
+        <p:cNvGrpSpPr/>
+        <p:nvPr/>
+      </p:nvGrpSpPr>
+      <p:grpSpPr>
+        <a:xfrm>
+          <a:off x="0" y="0"/>
+          <a:ext cx="0" cy="0"/>
+          <a:chOff x="0" y="0"/>
+          <a:chExt cx="0" cy="0"/>
+        </a:xfrm>
+      </p:grpSpPr>
+      <p:sp>
+        <p:nvSpPr>
+          <p:cNvPr id="2" name="Title 1">
+            <a:extLst>
+              <a:ext uri="{FF2B5EF4-FFF2-40B4-BE49-F238E27FC236}">
+                <a16:creationId xmlns:a16="http://schemas.microsoft.com/office/drawing/2014/main" id="{D0848193-4417-D08F-05F1-15BCD24D1F98}"/>
+              </a:ext>
+            </a:extLst>
+          </p:cNvPr>
+          <p:cNvSpPr>
+            <a:spLocks noGrp="1"/>
+          </p:cNvSpPr>
+          <p:nvPr>
+            <p:ph type="title"/>
+          </p:nvPr>
+        </p:nvSpPr>
+        <p:spPr/>
+        <p:txBody>
+          <a:bodyPr/>
+          <a:lstStyle/>
+          <a:p>
+            <a:r>
+              <a:rPr lang="en-US" dirty="0"/>
+              <a:t>Break then Kahoot Time!</a:t>
+            </a:r>
+          </a:p>
+        </p:txBody>
+      </p:sp>
+      <p:sp>
+        <p:nvSpPr>
+          <p:cNvPr id="3" name="Content Placeholder 2">
+            <a:extLst>
+              <a:ext uri="{FF2B5EF4-FFF2-40B4-BE49-F238E27FC236}">
+                <a16:creationId xmlns:a16="http://schemas.microsoft.com/office/drawing/2014/main" id="{AB9909B6-D559-A917-5708-EC5151D15F7F}"/>
+              </a:ext>
+            </a:extLst>
+          </p:cNvPr>
+          <p:cNvSpPr>
+            <a:spLocks noGrp="1"/>
+          </p:cNvSpPr>
+          <p:nvPr>
+            <p:ph idx="1"/>
+          </p:nvPr>
+        </p:nvSpPr>
+        <p:spPr/>
+        <p:txBody>
+          <a:bodyPr/>
+          <a:lstStyle/>
+          <a:p>
+            <a:endParaRPr lang="en-US" dirty="0"/>
+          </a:p>
+        </p:txBody>
+      </p:sp>
+    </p:spTree>
+    <p:extLst>
+      <p:ext uri="{BB962C8B-B14F-4D97-AF65-F5344CB8AC3E}">
+        <p14:creationId xmlns:p14="http://schemas.microsoft.com/office/powerpoint/2010/main" val="3695447874"/>
+      </p:ext>
+    </p:extLst>
+  </p:cSld>
+  <p:clrMapOvr>
+    <a:masterClrMapping/>
+  </p:clrMapOvr>
+</p:sld>
+</file>
+
+<file path=ppt/slides/slide5.xml><?xml version="1.0" encoding="utf-8"?>
 <p:sld xmlns:a="http://schemas.openxmlformats.org/drawingml/2006/main" xmlns:r="http://schemas.openxmlformats.org/officeDocument/2006/relationships" xmlns:p="http://schemas.openxmlformats.org/presentationml/2006/main">
   <p:cSld>
     <p:spTree>

</xml_diff>